<commit_message>
Created Logo, Animation and ppt created
</commit_message>
<xml_diff>
--- a/ppt work/Moms kitchen Presentation.Pptx
+++ b/ppt work/Moms kitchen Presentation.Pptx
@@ -293,7 +293,7 @@
             <a:fld id="{0271BF10-E27D-4B12-A308-C14F3A59CE10}" type="datetimeFigureOut">
               <a:rPr lang="en-US" smtClean="0"/>
               <a:pPr/>
-              <a:t>5/25/2022</a:t>
+              <a:t>5/26/2022</a:t>
             </a:fld>
             <a:endParaRPr lang="en-US"/>
           </a:p>
@@ -460,7 +460,7 @@
             <a:fld id="{B734B7FF-E11D-41B0-A314-0B5383010460}" type="datetimeFigureOut">
               <a:rPr lang="en-US" smtClean="0"/>
               <a:pPr/>
-              <a:t>5/25/2022</a:t>
+              <a:t>5/26/2022</a:t>
             </a:fld>
             <a:endParaRPr lang="en-US"/>
           </a:p>
@@ -627,7 +627,7 @@
             <a:fld id="{94841228-83CA-44DF-9848-CD72F2F4E7BB}" type="datetimeFigureOut">
               <a:rPr lang="en-US" smtClean="0"/>
               <a:pPr/>
-              <a:t>5/25/2022</a:t>
+              <a:t>5/26/2022</a:t>
             </a:fld>
             <a:endParaRPr lang="en-US"/>
           </a:p>
@@ -794,7 +794,7 @@
             <a:fld id="{DF8CB1EF-82CD-4E78-A7CB-9E5D4C5E729B}" type="datetimeFigureOut">
               <a:rPr lang="en-US" smtClean="0"/>
               <a:pPr/>
-              <a:t>5/25/2022</a:t>
+              <a:t>5/26/2022</a:t>
             </a:fld>
             <a:endParaRPr lang="en-US"/>
           </a:p>
@@ -1027,7 +1027,7 @@
             <a:fld id="{DBCC0464-C42E-41B8-8FDF-604F55EAF17D}" type="datetimeFigureOut">
               <a:rPr lang="en-US" smtClean="0"/>
               <a:pPr/>
-              <a:t>5/25/2022</a:t>
+              <a:t>5/26/2022</a:t>
             </a:fld>
             <a:endParaRPr lang="en-US"/>
           </a:p>
@@ -1301,7 +1301,7 @@
             <a:fld id="{066D35CF-0EAA-40B5-BC50-E2040A0520F0}" type="datetimeFigureOut">
               <a:rPr lang="en-US" smtClean="0"/>
               <a:pPr/>
-              <a:t>5/25/2022</a:t>
+              <a:t>5/26/2022</a:t>
             </a:fld>
             <a:endParaRPr lang="en-US"/>
           </a:p>
@@ -1693,7 +1693,7 @@
             <a:fld id="{17D6E8F5-D22C-4EDF-8605-78620BE39C1A}" type="datetimeFigureOut">
               <a:rPr lang="en-US" smtClean="0"/>
               <a:pPr/>
-              <a:t>5/25/2022</a:t>
+              <a:t>5/26/2022</a:t>
             </a:fld>
             <a:endParaRPr lang="en-US"/>
           </a:p>
@@ -1809,7 +1809,7 @@
             <a:fld id="{9D78B20F-A106-4448-8EA3-5A9F0E4EDBE2}" type="datetimeFigureOut">
               <a:rPr lang="en-US" smtClean="0"/>
               <a:pPr/>
-              <a:t>5/25/2022</a:t>
+              <a:t>5/26/2022</a:t>
             </a:fld>
             <a:endParaRPr lang="en-US"/>
           </a:p>
@@ -1902,7 +1902,7 @@
             <a:fld id="{EFEC322C-3AE3-48FA-8422-9850D31CA2E1}" type="datetimeFigureOut">
               <a:rPr lang="en-US" smtClean="0"/>
               <a:pPr/>
-              <a:t>5/25/2022</a:t>
+              <a:t>5/26/2022</a:t>
             </a:fld>
             <a:endParaRPr lang="en-US"/>
           </a:p>
@@ -2160,7 +2160,7 @@
             <a:fld id="{DDF2D444-9176-4180-9544-B5D0433841F1}" type="datetimeFigureOut">
               <a:rPr lang="en-US" smtClean="0"/>
               <a:pPr/>
-              <a:t>5/25/2022</a:t>
+              <a:t>5/26/2022</a:t>
             </a:fld>
             <a:endParaRPr lang="en-US"/>
           </a:p>
@@ -2395,7 +2395,7 @@
             <a:fld id="{78924CDE-384D-4BF7-A30B-EDEEE80EF984}" type="datetimeFigureOut">
               <a:rPr lang="en-US" smtClean="0"/>
               <a:pPr/>
-              <a:t>5/25/2022</a:t>
+              <a:t>5/26/2022</a:t>
             </a:fld>
             <a:endParaRPr lang="en-US"/>
           </a:p>
@@ -2605,7 +2605,7 @@
             <a:fld id="{E8FD0B7A-F5DD-4F40-B4CB-3B2C354B893A}" type="datetimeFigureOut">
               <a:rPr lang="en-US" smtClean="0"/>
               <a:pPr/>
-              <a:t>5/25/2022</a:t>
+              <a:t>5/26/2022</a:t>
             </a:fld>
             <a:endParaRPr lang="en-US"/>
           </a:p>
@@ -3153,17 +3153,8 @@
               <a:rPr lang="en-US" sz="3200" dirty="0" smtClean="0">
                 <a:latin typeface="Georgia" pitchFamily="18" charset="0"/>
               </a:rPr>
-              <a:t> </a:t>
-            </a:r>
-            <a:r>
-              <a:rPr lang="en-US" sz="3200" dirty="0" smtClean="0">
-                <a:latin typeface="Georgia" pitchFamily="18" charset="0"/>
-              </a:rPr>
-              <a:t>We are providing homemade food to user</a:t>
-            </a:r>
-            <a:endParaRPr lang="en-US" sz="3200" dirty="0" smtClean="0">
-              <a:latin typeface="Georgia" pitchFamily="18" charset="0"/>
-            </a:endParaRPr>
+              <a:t> We are providing homemade food to user</a:t>
+            </a:r>
           </a:p>
           <a:p>
             <a:endParaRPr lang="en-US" sz="3200" dirty="0">
@@ -4472,13 +4463,7 @@
               <a:rPr lang="en-US" sz="3000" dirty="0" smtClean="0">
                 <a:latin typeface="Georgia" pitchFamily="18" charset="0"/>
               </a:rPr>
-              <a:t>Maintain </a:t>
-            </a:r>
-            <a:r>
-              <a:rPr lang="en-US" sz="3000" dirty="0" smtClean="0">
-                <a:latin typeface="Georgia" pitchFamily="18" charset="0"/>
-              </a:rPr>
-              <a:t>food quality &amp; hygiene </a:t>
+              <a:t>Maintain food quality &amp; hygiene </a:t>
             </a:r>
           </a:p>
           <a:p>
@@ -4665,13 +4650,7 @@
               <a:rPr lang="en-US" sz="2000" dirty="0" smtClean="0">
                 <a:latin typeface="Georgia" pitchFamily="18" charset="0"/>
               </a:rPr>
-              <a:t>User </a:t>
-            </a:r>
-            <a:r>
-              <a:rPr lang="en-US" sz="2000" dirty="0" smtClean="0">
-                <a:latin typeface="Georgia" pitchFamily="18" charset="0"/>
-              </a:rPr>
-              <a:t>can select any one of service provider permanently </a:t>
+              <a:t>User can select any one of service provider permanently </a:t>
             </a:r>
             <a:endParaRPr lang="en-US" sz="2000" dirty="0">
               <a:latin typeface="Georgia" pitchFamily="18" charset="0"/>
@@ -4721,13 +4700,7 @@
               <a:rPr lang="en-US" sz="2000" dirty="0" smtClean="0">
                 <a:latin typeface="Georgia" pitchFamily="18" charset="0"/>
               </a:rPr>
-              <a:t>User </a:t>
-            </a:r>
-            <a:r>
-              <a:rPr lang="en-US" sz="2000" dirty="0" smtClean="0">
-                <a:latin typeface="Georgia" pitchFamily="18" charset="0"/>
-              </a:rPr>
-              <a:t>have freedom to choose their service provider on weekly basis</a:t>
+              <a:t>User have freedom to choose their service provider on weekly basis</a:t>
             </a:r>
             <a:endParaRPr lang="en-US" sz="2000" dirty="0">
               <a:latin typeface="Georgia" pitchFamily="18" charset="0"/>
@@ -4777,13 +4750,7 @@
               <a:rPr lang="en-US" sz="2000" dirty="0" smtClean="0">
                 <a:latin typeface="Georgia" pitchFamily="18" charset="0"/>
               </a:rPr>
-              <a:t>We </a:t>
-            </a:r>
-            <a:r>
-              <a:rPr lang="en-US" sz="2000" dirty="0" smtClean="0">
-                <a:latin typeface="Georgia" pitchFamily="18" charset="0"/>
-              </a:rPr>
-              <a:t>Will Provide Add-On With Meal </a:t>
+              <a:t>We Will Provide Add-On With Meal </a:t>
             </a:r>
             <a:endParaRPr lang="en-US" sz="2000" dirty="0">
               <a:latin typeface="Georgia" pitchFamily="18" charset="0"/>
@@ -5347,6 +5314,122 @@
           </a:prstGeom>
         </p:spPr>
       </p:pic>
+      <p:sp>
+        <p:nvSpPr>
+          <p:cNvPr id="5" name="TextBox 4"/>
+          <p:cNvSpPr txBox="1"/>
+          <p:nvPr/>
+        </p:nvSpPr>
+        <p:spPr>
+          <a:xfrm>
+            <a:off x="1598612" y="1828800"/>
+            <a:ext cx="9982200" cy="3539430"/>
+          </a:xfrm>
+          <a:prstGeom prst="rect">
+            <a:avLst/>
+          </a:prstGeom>
+          <a:noFill/>
+        </p:spPr>
+        <p:txBody>
+          <a:bodyPr wrap="square" rtlCol="0">
+            <a:spAutoFit/>
+          </a:bodyPr>
+          <a:lstStyle/>
+          <a:p>
+            <a:pPr>
+              <a:buFont typeface="Wingdings" pitchFamily="2" charset="2"/>
+              <a:buChar char="Ø"/>
+            </a:pPr>
+            <a:r>
+              <a:rPr lang="en-US" sz="2800" dirty="0" smtClean="0">
+                <a:latin typeface="Georgia" pitchFamily="18" charset="0"/>
+              </a:rPr>
+              <a:t>Initially, we will deliver using rental bikes by </a:t>
+            </a:r>
+            <a:r>
+              <a:rPr lang="en-US" sz="2800" dirty="0" err="1" smtClean="0">
+                <a:latin typeface="Georgia" pitchFamily="18" charset="0"/>
+              </a:rPr>
+              <a:t>ourself</a:t>
+            </a:r>
+            <a:r>
+              <a:rPr lang="en-US" sz="2800" dirty="0" smtClean="0">
+                <a:latin typeface="Georgia" pitchFamily="18" charset="0"/>
+              </a:rPr>
+              <a:t>, this will cost Rs. 3000 for two bikes per month</a:t>
+            </a:r>
+            <a:r>
+              <a:rPr lang="en-US" sz="2800" dirty="0" smtClean="0">
+                <a:latin typeface="Georgia" pitchFamily="18" charset="0"/>
+              </a:rPr>
+              <a:t>.</a:t>
+            </a:r>
+          </a:p>
+          <a:p>
+            <a:pPr>
+              <a:buFont typeface="Wingdings" pitchFamily="2" charset="2"/>
+              <a:buChar char="Ø"/>
+            </a:pPr>
+            <a:endParaRPr lang="en-US" sz="2800" dirty="0" smtClean="0">
+              <a:latin typeface="Georgia" pitchFamily="18" charset="0"/>
+            </a:endParaRPr>
+          </a:p>
+          <a:p>
+            <a:pPr>
+              <a:buFont typeface="Wingdings" pitchFamily="2" charset="2"/>
+              <a:buChar char="Ø"/>
+            </a:pPr>
+            <a:r>
+              <a:rPr lang="en-US" sz="2800" dirty="0" smtClean="0">
+                <a:latin typeface="Georgia" pitchFamily="18" charset="0"/>
+              </a:rPr>
+              <a:t>After reaching our milestone of 100 customers, we will start hiring delivery boys, which will cost Rs.7,200</a:t>
+            </a:r>
+            <a:r>
+              <a:rPr lang="en-US" sz="2800" dirty="0" smtClean="0">
+                <a:latin typeface="Georgia" pitchFamily="18" charset="0"/>
+              </a:rPr>
+              <a:t>.</a:t>
+            </a:r>
+          </a:p>
+          <a:p>
+            <a:pPr>
+              <a:buFont typeface="Wingdings" pitchFamily="2" charset="2"/>
+              <a:buChar char="Ø"/>
+            </a:pPr>
+            <a:endParaRPr lang="en-US" sz="2800" dirty="0" smtClean="0">
+              <a:latin typeface="Georgia" pitchFamily="18" charset="0"/>
+            </a:endParaRPr>
+          </a:p>
+          <a:p>
+            <a:pPr>
+              <a:buFont typeface="Wingdings" pitchFamily="2" charset="2"/>
+              <a:buChar char="Ø"/>
+            </a:pPr>
+            <a:r>
+              <a:rPr lang="en-US" sz="2800" dirty="0" smtClean="0">
+                <a:latin typeface="Georgia" pitchFamily="18" charset="0"/>
+              </a:rPr>
+              <a:t>We will not take delivery charges on </a:t>
+            </a:r>
+            <a:r>
+              <a:rPr lang="en-US" sz="2800" dirty="0" err="1" smtClean="0">
+                <a:latin typeface="Georgia" pitchFamily="18" charset="0"/>
+              </a:rPr>
+              <a:t>tiffins</a:t>
+            </a:r>
+            <a:r>
+              <a:rPr lang="en-US" sz="2800" dirty="0" smtClean="0">
+                <a:latin typeface="Georgia" pitchFamily="18" charset="0"/>
+              </a:rPr>
+              <a:t>, but on add-ons.</a:t>
+            </a:r>
+          </a:p>
+          <a:p>
+            <a:endParaRPr lang="en-US" sz="2800" dirty="0"/>
+          </a:p>
+        </p:txBody>
+      </p:sp>
     </p:spTree>
   </p:cSld>
   <p:clrMapOvr>

</xml_diff>